<commit_message>
refactor layouts & improve arbor
</commit_message>
<xml_diff>
--- a/doc/cytoweb-architecture.pptx
+++ b/doc/cytoweb-architecture.pptx
@@ -289,7 +289,7 @@
             <a:fld id="{2EF40BE3-AAA9-B947-A315-8E7FE471E5DA}" type="datetimeFigureOut">
               <a:rPr lang="en-US" smtClean="0"/>
               <a:pPr/>
-              <a:t>12/14/11</a:t>
+              <a:t>5/1/12</a:t>
             </a:fld>
             <a:endParaRPr lang="en-US"/>
           </a:p>
@@ -456,7 +456,7 @@
             <a:fld id="{2EF40BE3-AAA9-B947-A315-8E7FE471E5DA}" type="datetimeFigureOut">
               <a:rPr lang="en-US" smtClean="0"/>
               <a:pPr/>
-              <a:t>12/14/11</a:t>
+              <a:t>5/1/12</a:t>
             </a:fld>
             <a:endParaRPr lang="en-US"/>
           </a:p>
@@ -633,7 +633,7 @@
             <a:fld id="{2EF40BE3-AAA9-B947-A315-8E7FE471E5DA}" type="datetimeFigureOut">
               <a:rPr lang="en-US" smtClean="0"/>
               <a:pPr/>
-              <a:t>12/14/11</a:t>
+              <a:t>5/1/12</a:t>
             </a:fld>
             <a:endParaRPr lang="en-US"/>
           </a:p>
@@ -800,7 +800,7 @@
             <a:fld id="{2EF40BE3-AAA9-B947-A315-8E7FE471E5DA}" type="datetimeFigureOut">
               <a:rPr lang="en-US" smtClean="0"/>
               <a:pPr/>
-              <a:t>12/14/11</a:t>
+              <a:t>5/1/12</a:t>
             </a:fld>
             <a:endParaRPr lang="en-US"/>
           </a:p>
@@ -1043,7 +1043,7 @@
             <a:fld id="{2EF40BE3-AAA9-B947-A315-8E7FE471E5DA}" type="datetimeFigureOut">
               <a:rPr lang="en-US" smtClean="0"/>
               <a:pPr/>
-              <a:t>12/14/11</a:t>
+              <a:t>5/1/12</a:t>
             </a:fld>
             <a:endParaRPr lang="en-US"/>
           </a:p>
@@ -1328,7 +1328,7 @@
             <a:fld id="{2EF40BE3-AAA9-B947-A315-8E7FE471E5DA}" type="datetimeFigureOut">
               <a:rPr lang="en-US" smtClean="0"/>
               <a:pPr/>
-              <a:t>12/14/11</a:t>
+              <a:t>5/1/12</a:t>
             </a:fld>
             <a:endParaRPr lang="en-US"/>
           </a:p>
@@ -1747,7 +1747,7 @@
             <a:fld id="{2EF40BE3-AAA9-B947-A315-8E7FE471E5DA}" type="datetimeFigureOut">
               <a:rPr lang="en-US" smtClean="0"/>
               <a:pPr/>
-              <a:t>12/14/11</a:t>
+              <a:t>5/1/12</a:t>
             </a:fld>
             <a:endParaRPr lang="en-US"/>
           </a:p>
@@ -1862,7 +1862,7 @@
             <a:fld id="{2EF40BE3-AAA9-B947-A315-8E7FE471E5DA}" type="datetimeFigureOut">
               <a:rPr lang="en-US" smtClean="0"/>
               <a:pPr/>
-              <a:t>12/14/11</a:t>
+              <a:t>5/1/12</a:t>
             </a:fld>
             <a:endParaRPr lang="en-US"/>
           </a:p>
@@ -1954,7 +1954,7 @@
             <a:fld id="{2EF40BE3-AAA9-B947-A315-8E7FE471E5DA}" type="datetimeFigureOut">
               <a:rPr lang="en-US" smtClean="0"/>
               <a:pPr/>
-              <a:t>12/14/11</a:t>
+              <a:t>5/1/12</a:t>
             </a:fld>
             <a:endParaRPr lang="en-US"/>
           </a:p>
@@ -2228,7 +2228,7 @@
             <a:fld id="{2EF40BE3-AAA9-B947-A315-8E7FE471E5DA}" type="datetimeFigureOut">
               <a:rPr lang="en-US" smtClean="0"/>
               <a:pPr/>
-              <a:t>12/14/11</a:t>
+              <a:t>5/1/12</a:t>
             </a:fld>
             <a:endParaRPr lang="en-US"/>
           </a:p>
@@ -2478,7 +2478,7 @@
             <a:fld id="{2EF40BE3-AAA9-B947-A315-8E7FE471E5DA}" type="datetimeFigureOut">
               <a:rPr lang="en-US" smtClean="0"/>
               <a:pPr/>
-              <a:t>12/14/11</a:t>
+              <a:t>5/1/12</a:t>
             </a:fld>
             <a:endParaRPr lang="en-US"/>
           </a:p>
@@ -2690,7 +2690,7 @@
             <a:fld id="{2EF40BE3-AAA9-B947-A315-8E7FE471E5DA}" type="datetimeFigureOut">
               <a:rPr lang="en-US" smtClean="0"/>
               <a:pPr/>
-              <a:t>12/14/11</a:t>
+              <a:t>5/1/12</a:t>
             </a:fld>
             <a:endParaRPr lang="en-US"/>
           </a:p>
@@ -3181,71 +3181,14 @@
       </p:sp>
       <p:sp>
         <p:nvSpPr>
-          <p:cNvPr id="9" name="Rectangle 8"/>
-          <p:cNvSpPr/>
-          <p:nvPr/>
-        </p:nvSpPr>
-        <p:spPr>
-          <a:xfrm>
-            <a:off x="6519355" y="1046374"/>
-            <a:ext cx="1665919" cy="651473"/>
-          </a:xfrm>
-          <a:prstGeom prst="rect">
-            <a:avLst/>
-          </a:prstGeom>
-          <a:solidFill>
-            <a:schemeClr val="bg1">
-              <a:lumMod val="50000"/>
-            </a:schemeClr>
-          </a:solidFill>
-          <a:ln>
-            <a:noFill/>
-          </a:ln>
-          <a:effectLst/>
-        </p:spPr>
-        <p:style>
-          <a:lnRef idx="1">
-            <a:schemeClr val="accent1"/>
-          </a:lnRef>
-          <a:fillRef idx="3">
-            <a:schemeClr val="accent1"/>
-          </a:fillRef>
-          <a:effectRef idx="2">
-            <a:schemeClr val="accent1"/>
-          </a:effectRef>
-          <a:fontRef idx="minor">
-            <a:schemeClr val="lt1"/>
-          </a:fontRef>
-        </p:style>
-        <p:txBody>
-          <a:bodyPr rtlCol="0" anchor="ctr"/>
-          <a:lstStyle/>
-          <a:p>
-            <a:pPr algn="ctr"/>
-            <a:r>
-              <a:rPr lang="en-US" dirty="0" smtClean="0">
-                <a:latin typeface="Helvetica Neue"/>
-                <a:cs typeface="Helvetica Neue"/>
-              </a:rPr>
-              <a:t>EXPORTER</a:t>
-            </a:r>
-            <a:endParaRPr lang="en-US" dirty="0">
-              <a:latin typeface="Helvetica Neue"/>
-              <a:cs typeface="Helvetica Neue"/>
-            </a:endParaRPr>
-          </a:p>
-        </p:txBody>
-      </p:sp>
-      <p:sp>
-        <p:nvSpPr>
           <p:cNvPr id="47" name="TextBox 46"/>
           <p:cNvSpPr txBox="1"/>
           <p:nvPr/>
         </p:nvSpPr>
         <p:spPr>
           <a:xfrm>
-            <a:off x="3052963" y="4618714"/>
-            <a:ext cx="518217" cy="369332"/>
+            <a:off x="2662128" y="4618714"/>
+            <a:ext cx="1202176" cy="369332"/>
           </a:xfrm>
           <a:prstGeom prst="rect">
             <a:avLst/>
@@ -3268,7 +3211,7 @@
                 <a:latin typeface="Helvetica Neue"/>
                 <a:cs typeface="Helvetica Neue"/>
               </a:rPr>
-              <a:t>run</a:t>
+              <a:t>.run() et al</a:t>
             </a:r>
             <a:endParaRPr lang="en-US" dirty="0">
               <a:solidFill>
@@ -3526,8 +3469,8 @@
         </p:nvSpPr>
         <p:spPr>
           <a:xfrm>
-            <a:off x="2917560" y="1054621"/>
-            <a:ext cx="753209" cy="369332"/>
+            <a:off x="2843337" y="1054621"/>
+            <a:ext cx="936953" cy="369332"/>
           </a:xfrm>
           <a:prstGeom prst="rect">
             <a:avLst/>
@@ -3548,7 +3491,7 @@
                 <a:latin typeface="Helvetica Neue"/>
                 <a:cs typeface="Helvetica Neue"/>
               </a:rPr>
-              <a:t>notify</a:t>
+              <a:t>.notify()</a:t>
             </a:r>
             <a:endParaRPr lang="en-US" dirty="0">
               <a:solidFill>
@@ -3603,49 +3546,6 @@
           </a:fontRef>
         </p:style>
       </p:cxnSp>
-      <p:cxnSp>
-        <p:nvCxnSpPr>
-          <p:cNvPr id="95" name="Straight Arrow Connector 94"/>
-          <p:cNvCxnSpPr/>
-          <p:nvPr/>
-        </p:nvCxnSpPr>
-        <p:spPr>
-          <a:xfrm rot="10800000">
-            <a:off x="5014252" y="3466099"/>
-            <a:ext cx="2824652" cy="2108536"/>
-          </a:xfrm>
-          <a:prstGeom prst="straightConnector1">
-            <a:avLst/>
-          </a:prstGeom>
-          <a:ln w="50800" cap="flat" cmpd="sng" algn="ctr">
-            <a:solidFill>
-              <a:schemeClr val="accent6">
-                <a:lumMod val="60000"/>
-                <a:lumOff val="40000"/>
-              </a:schemeClr>
-            </a:solidFill>
-            <a:prstDash val="solid"/>
-            <a:round/>
-            <a:headEnd type="none" w="med" len="med"/>
-            <a:tailEnd type="triangle" w="med" len="med"/>
-          </a:ln>
-          <a:effectLst/>
-        </p:spPr>
-        <p:style>
-          <a:lnRef idx="2">
-            <a:schemeClr val="accent1"/>
-          </a:lnRef>
-          <a:fillRef idx="0">
-            <a:schemeClr val="accent1"/>
-          </a:fillRef>
-          <a:effectRef idx="1">
-            <a:schemeClr val="accent1"/>
-          </a:effectRef>
-          <a:fontRef idx="minor">
-            <a:schemeClr val="tx1"/>
-          </a:fontRef>
-        </p:style>
-      </p:cxnSp>
       <p:sp>
         <p:nvSpPr>
           <p:cNvPr id="96" name="TextBox 95"/>
@@ -3653,8 +3553,8 @@
           <p:nvPr/>
         </p:nvSpPr>
         <p:spPr>
-          <a:xfrm rot="2205705">
-            <a:off x="5593874" y="4027786"/>
+          <a:xfrm>
+            <a:off x="5492586" y="2251957"/>
             <a:ext cx="1326542" cy="369332"/>
           </a:xfrm>
           <a:prstGeom prst="rect">
@@ -3691,15 +3591,12 @@
       <p:cxnSp>
         <p:nvCxnSpPr>
           <p:cNvPr id="99" name="Elbow Connector 98"/>
-          <p:cNvCxnSpPr>
-            <a:stCxn id="7" idx="2"/>
-            <a:endCxn id="123" idx="4"/>
-          </p:cNvCxnSpPr>
+          <p:cNvCxnSpPr/>
           <p:nvPr/>
         </p:nvCxnSpPr>
         <p:spPr>
           <a:xfrm rot="5400000" flipH="1" flipV="1">
-            <a:off x="2329823" y="3181736"/>
+            <a:off x="2312705" y="3181736"/>
             <a:ext cx="1480516" cy="2684611"/>
           </a:xfrm>
           <a:prstGeom prst="bentConnector3">
@@ -3775,91 +3672,6 @@
           </a:p>
         </p:txBody>
       </p:sp>
-      <p:cxnSp>
-        <p:nvCxnSpPr>
-          <p:cNvPr id="121" name="Shape 120"/>
-          <p:cNvCxnSpPr>
-            <a:stCxn id="123" idx="6"/>
-            <a:endCxn id="9" idx="2"/>
-          </p:cNvCxnSpPr>
-          <p:nvPr/>
-        </p:nvCxnSpPr>
-        <p:spPr>
-          <a:xfrm flipV="1">
-            <a:off x="5117515" y="1697847"/>
-            <a:ext cx="2234800" cy="1380809"/>
-          </a:xfrm>
-          <a:prstGeom prst="bentConnector2">
-            <a:avLst/>
-          </a:prstGeom>
-          <a:ln>
-            <a:solidFill>
-              <a:schemeClr val="accent1">
-                <a:lumMod val="60000"/>
-                <a:lumOff val="40000"/>
-              </a:schemeClr>
-            </a:solidFill>
-            <a:tailEnd type="triangle"/>
-          </a:ln>
-          <a:effectLst/>
-        </p:spPr>
-        <p:style>
-          <a:lnRef idx="2">
-            <a:schemeClr val="accent1"/>
-          </a:lnRef>
-          <a:fillRef idx="0">
-            <a:schemeClr val="accent1"/>
-          </a:fillRef>
-          <a:effectRef idx="1">
-            <a:schemeClr val="accent1"/>
-          </a:effectRef>
-          <a:fontRef idx="minor">
-            <a:schemeClr val="tx1"/>
-          </a:fontRef>
-        </p:style>
-      </p:cxnSp>
-      <p:sp>
-        <p:nvSpPr>
-          <p:cNvPr id="122" name="TextBox 121"/>
-          <p:cNvSpPr txBox="1"/>
-          <p:nvPr/>
-        </p:nvSpPr>
-        <p:spPr>
-          <a:xfrm>
-            <a:off x="5715714" y="2742313"/>
-            <a:ext cx="958417" cy="369332"/>
-          </a:xfrm>
-          <a:prstGeom prst="rect">
-            <a:avLst/>
-          </a:prstGeom>
-          <a:noFill/>
-        </p:spPr>
-        <p:txBody>
-          <a:bodyPr wrap="none" rtlCol="0">
-            <a:spAutoFit/>
-          </a:bodyPr>
-          <a:lstStyle/>
-          <a:p>
-            <a:r>
-              <a:rPr lang="en-US" dirty="0" smtClean="0">
-                <a:solidFill>
-                  <a:schemeClr val="accent1"/>
-                </a:solidFill>
-                <a:latin typeface="Helvetica Neue"/>
-                <a:cs typeface="Helvetica Neue"/>
-              </a:rPr>
-              <a:t>convert</a:t>
-            </a:r>
-            <a:endParaRPr lang="en-US" dirty="0">
-              <a:solidFill>
-                <a:schemeClr val="accent1"/>
-              </a:solidFill>
-              <a:latin typeface="Helvetica Neue"/>
-              <a:cs typeface="Helvetica Neue"/>
-            </a:endParaRPr>
-          </a:p>
-        </p:txBody>
-      </p:sp>
       <p:sp>
         <p:nvSpPr>
           <p:cNvPr id="123" name="Oval 122"/>
@@ -3926,13 +3738,13 @@
         </p:nvSpPr>
         <p:spPr>
           <a:xfrm rot="5400000">
-            <a:off x="1538482" y="-677596"/>
-            <a:ext cx="5846772" cy="7983216"/>
+            <a:off x="-304837" y="1165723"/>
+            <a:ext cx="5846772" cy="4296577"/>
           </a:xfrm>
           <a:prstGeom prst="snipRoundRect">
             <a:avLst>
               <a:gd name="adj1" fmla="val 0"/>
-              <a:gd name="adj2" fmla="val 50000"/>
+              <a:gd name="adj2" fmla="val 0"/>
             </a:avLst>
           </a:prstGeom>
           <a:noFill/>
@@ -3978,7 +3790,7 @@
         </p:nvSpPr>
         <p:spPr>
           <a:xfrm>
-            <a:off x="7055423" y="4707648"/>
+            <a:off x="7144724" y="419289"/>
             <a:ext cx="1533958" cy="1533958"/>
           </a:xfrm>
           <a:prstGeom prst="ellipse">
@@ -4065,6 +3877,435 @@
               <a:t>CYTOSCAPE WEB</a:t>
             </a:r>
             <a:endParaRPr lang="en-US" b="1" dirty="0">
+              <a:latin typeface="Helvetica Neue"/>
+              <a:cs typeface="Helvetica Neue"/>
+            </a:endParaRPr>
+          </a:p>
+        </p:txBody>
+      </p:sp>
+      <p:sp>
+        <p:nvSpPr>
+          <p:cNvPr id="31" name="Oval 30"/>
+          <p:cNvSpPr/>
+          <p:nvPr/>
+        </p:nvSpPr>
+        <p:spPr>
+          <a:xfrm>
+            <a:off x="7144723" y="2311676"/>
+            <a:ext cx="1533958" cy="1533958"/>
+          </a:xfrm>
+          <a:prstGeom prst="ellipse">
+            <a:avLst/>
+          </a:prstGeom>
+          <a:solidFill>
+            <a:schemeClr val="accent5">
+              <a:lumMod val="60000"/>
+              <a:lumOff val="40000"/>
+            </a:schemeClr>
+          </a:solidFill>
+          <a:ln>
+            <a:noFill/>
+          </a:ln>
+          <a:effectLst/>
+        </p:spPr>
+        <p:style>
+          <a:lnRef idx="1">
+            <a:schemeClr val="accent1"/>
+          </a:lnRef>
+          <a:fillRef idx="3">
+            <a:schemeClr val="accent1"/>
+          </a:fillRef>
+          <a:effectRef idx="2">
+            <a:schemeClr val="accent1"/>
+          </a:effectRef>
+          <a:fontRef idx="minor">
+            <a:schemeClr val="lt1"/>
+          </a:fontRef>
+        </p:style>
+        <p:txBody>
+          <a:bodyPr wrap="none" rtlCol="0" anchor="ctr"/>
+          <a:lstStyle/>
+          <a:p>
+            <a:pPr algn="ctr"/>
+            <a:r>
+              <a:rPr lang="en-US" b="1" dirty="0" smtClean="0">
+                <a:latin typeface="Helvetica Neue"/>
+                <a:cs typeface="Helvetica Neue"/>
+              </a:rPr>
+              <a:t>3</a:t>
+            </a:r>
+            <a:r>
+              <a:rPr lang="en-US" b="1" baseline="30000" dirty="0" smtClean="0">
+                <a:latin typeface="Helvetica Neue"/>
+                <a:cs typeface="Helvetica Neue"/>
+              </a:rPr>
+              <a:t>rd</a:t>
+            </a:r>
+            <a:r>
+              <a:rPr lang="en-US" b="1" dirty="0" smtClean="0">
+                <a:latin typeface="Helvetica Neue"/>
+                <a:cs typeface="Helvetica Neue"/>
+              </a:rPr>
+              <a:t> </a:t>
+            </a:r>
+            <a:r>
+              <a:rPr lang="en-US" b="1" dirty="0" smtClean="0">
+                <a:latin typeface="Helvetica Neue"/>
+                <a:cs typeface="Helvetica Neue"/>
+              </a:rPr>
+              <a:t>PARTY</a:t>
+            </a:r>
+          </a:p>
+          <a:p>
+            <a:pPr algn="ctr"/>
+            <a:r>
+              <a:rPr lang="en-US" b="1" dirty="0" smtClean="0">
+                <a:latin typeface="Helvetica Neue"/>
+                <a:cs typeface="Helvetica Neue"/>
+              </a:rPr>
+              <a:t>EXTENTIONS</a:t>
+            </a:r>
+            <a:endParaRPr lang="en-US" b="1" dirty="0">
+              <a:latin typeface="Helvetica Neue"/>
+              <a:cs typeface="Helvetica Neue"/>
+            </a:endParaRPr>
+          </a:p>
+        </p:txBody>
+      </p:sp>
+      <p:cxnSp>
+        <p:nvCxnSpPr>
+          <p:cNvPr id="33" name="Straight Arrow Connector 32"/>
+          <p:cNvCxnSpPr>
+            <a:stCxn id="31" idx="2"/>
+            <a:endCxn id="123" idx="6"/>
+          </p:cNvCxnSpPr>
+          <p:nvPr/>
+        </p:nvCxnSpPr>
+        <p:spPr>
+          <a:xfrm rot="10800000" flipV="1">
+            <a:off x="5117515" y="3078654"/>
+            <a:ext cx="2027208" cy="1"/>
+          </a:xfrm>
+          <a:prstGeom prst="straightConnector1">
+            <a:avLst/>
+          </a:prstGeom>
+          <a:ln w="50800" cap="flat" cmpd="sng" algn="ctr">
+            <a:solidFill>
+              <a:schemeClr val="accent5">
+                <a:lumMod val="40000"/>
+                <a:lumOff val="60000"/>
+              </a:schemeClr>
+            </a:solidFill>
+            <a:prstDash val="solid"/>
+            <a:round/>
+            <a:headEnd type="none" w="med" len="med"/>
+            <a:tailEnd type="triangle" w="lg" len="sm"/>
+          </a:ln>
+          <a:effectLst/>
+        </p:spPr>
+        <p:style>
+          <a:lnRef idx="2">
+            <a:schemeClr val="accent1"/>
+          </a:lnRef>
+          <a:fillRef idx="0">
+            <a:schemeClr val="accent1"/>
+          </a:fillRef>
+          <a:effectRef idx="1">
+            <a:schemeClr val="accent1"/>
+          </a:effectRef>
+          <a:fontRef idx="minor">
+            <a:schemeClr val="tx1"/>
+          </a:fontRef>
+        </p:style>
+      </p:cxnSp>
+      <p:sp>
+        <p:nvSpPr>
+          <p:cNvPr id="43" name="TextBox 42"/>
+          <p:cNvSpPr txBox="1"/>
+          <p:nvPr/>
+        </p:nvSpPr>
+        <p:spPr>
+          <a:xfrm>
+            <a:off x="5263986" y="2750558"/>
+            <a:ext cx="1880735" cy="369332"/>
+          </a:xfrm>
+          <a:prstGeom prst="rect">
+            <a:avLst/>
+          </a:prstGeom>
+          <a:noFill/>
+        </p:spPr>
+        <p:txBody>
+          <a:bodyPr wrap="square" rtlCol="0">
+            <a:spAutoFit/>
+          </a:bodyPr>
+          <a:lstStyle/>
+          <a:p>
+            <a:pPr algn="ctr"/>
+            <a:r>
+              <a:rPr lang="en-US" dirty="0" smtClean="0">
+                <a:solidFill>
+                  <a:schemeClr val="accent5">
+                    <a:lumMod val="75000"/>
+                  </a:schemeClr>
+                </a:solidFill>
+                <a:latin typeface="Helvetica Neue"/>
+                <a:cs typeface="Helvetica Neue"/>
+              </a:rPr>
+              <a:t>r</a:t>
+            </a:r>
+            <a:r>
+              <a:rPr lang="en-US" dirty="0" smtClean="0">
+                <a:solidFill>
+                  <a:schemeClr val="accent5">
+                    <a:lumMod val="75000"/>
+                  </a:schemeClr>
+                </a:solidFill>
+                <a:latin typeface="Helvetica Neue"/>
+                <a:cs typeface="Helvetica Neue"/>
+              </a:rPr>
+              <a:t>egister with</a:t>
+            </a:r>
+            <a:endParaRPr lang="en-US" dirty="0">
+              <a:solidFill>
+                <a:schemeClr val="accent5">
+                  <a:lumMod val="75000"/>
+                </a:schemeClr>
+              </a:solidFill>
+              <a:latin typeface="Helvetica Neue"/>
+              <a:cs typeface="Helvetica Neue"/>
+            </a:endParaRPr>
+          </a:p>
+        </p:txBody>
+      </p:sp>
+      <p:cxnSp>
+        <p:nvCxnSpPr>
+          <p:cNvPr id="46" name="Elbow Connector 45"/>
+          <p:cNvCxnSpPr>
+            <a:stCxn id="29" idx="2"/>
+          </p:cNvCxnSpPr>
+          <p:nvPr/>
+        </p:nvCxnSpPr>
+        <p:spPr>
+          <a:xfrm rot="10800000" flipV="1">
+            <a:off x="5117518" y="1186267"/>
+            <a:ext cx="2027206" cy="1393787"/>
+          </a:xfrm>
+          <a:prstGeom prst="bentConnector3">
+            <a:avLst>
+              <a:gd name="adj1" fmla="val 14200"/>
+            </a:avLst>
+          </a:prstGeom>
+          <a:ln w="50800" cap="flat" cmpd="sng" algn="ctr">
+            <a:solidFill>
+              <a:schemeClr val="accent6">
+                <a:lumMod val="40000"/>
+                <a:lumOff val="60000"/>
+              </a:schemeClr>
+            </a:solidFill>
+            <a:prstDash val="solid"/>
+            <a:round/>
+            <a:headEnd type="none" w="med" len="med"/>
+            <a:tailEnd type="triangle" w="lg" len="sm"/>
+          </a:ln>
+          <a:effectLst/>
+        </p:spPr>
+        <p:style>
+          <a:lnRef idx="2">
+            <a:schemeClr val="accent1"/>
+          </a:lnRef>
+          <a:fillRef idx="0">
+            <a:schemeClr val="accent1"/>
+          </a:fillRef>
+          <a:effectRef idx="1">
+            <a:schemeClr val="accent1"/>
+          </a:effectRef>
+          <a:fontRef idx="minor">
+            <a:schemeClr val="tx1"/>
+          </a:fontRef>
+        </p:style>
+      </p:cxnSp>
+      <p:sp>
+        <p:nvSpPr>
+          <p:cNvPr id="50" name="Oval 49"/>
+          <p:cNvSpPr/>
+          <p:nvPr/>
+        </p:nvSpPr>
+        <p:spPr>
+          <a:xfrm>
+            <a:off x="7144725" y="4289893"/>
+            <a:ext cx="1533958" cy="1533958"/>
+          </a:xfrm>
+          <a:prstGeom prst="ellipse">
+            <a:avLst/>
+          </a:prstGeom>
+          <a:solidFill>
+            <a:schemeClr val="accent5">
+              <a:lumMod val="60000"/>
+              <a:lumOff val="40000"/>
+            </a:schemeClr>
+          </a:solidFill>
+          <a:ln>
+            <a:noFill/>
+          </a:ln>
+          <a:effectLst/>
+        </p:spPr>
+        <p:style>
+          <a:lnRef idx="1">
+            <a:schemeClr val="accent1"/>
+          </a:lnRef>
+          <a:fillRef idx="3">
+            <a:schemeClr val="accent1"/>
+          </a:fillRef>
+          <a:effectRef idx="2">
+            <a:schemeClr val="accent1"/>
+          </a:effectRef>
+          <a:fontRef idx="minor">
+            <a:schemeClr val="lt1"/>
+          </a:fontRef>
+        </p:style>
+        <p:txBody>
+          <a:bodyPr wrap="none" rtlCol="0" anchor="ctr"/>
+          <a:lstStyle/>
+          <a:p>
+            <a:pPr algn="ctr"/>
+            <a:r>
+              <a:rPr lang="en-US" b="1" dirty="0" smtClean="0">
+                <a:latin typeface="Helvetica Neue"/>
+                <a:cs typeface="Helvetica Neue"/>
+              </a:rPr>
+              <a:t>3</a:t>
+            </a:r>
+            <a:r>
+              <a:rPr lang="en-US" b="1" baseline="30000" dirty="0" smtClean="0">
+                <a:latin typeface="Helvetica Neue"/>
+                <a:cs typeface="Helvetica Neue"/>
+              </a:rPr>
+              <a:t>rd</a:t>
+            </a:r>
+            <a:r>
+              <a:rPr lang="en-US" b="1" dirty="0" smtClean="0">
+                <a:latin typeface="Helvetica Neue"/>
+                <a:cs typeface="Helvetica Neue"/>
+              </a:rPr>
+              <a:t> </a:t>
+            </a:r>
+            <a:r>
+              <a:rPr lang="en-US" b="1" dirty="0" smtClean="0">
+                <a:latin typeface="Helvetica Neue"/>
+                <a:cs typeface="Helvetica Neue"/>
+              </a:rPr>
+              <a:t>PARTY</a:t>
+            </a:r>
+          </a:p>
+          <a:p>
+            <a:pPr algn="ctr"/>
+            <a:r>
+              <a:rPr lang="en-US" b="1" dirty="0" smtClean="0">
+                <a:latin typeface="Helvetica Neue"/>
+                <a:cs typeface="Helvetica Neue"/>
+              </a:rPr>
+              <a:t>JQUERY</a:t>
+            </a:r>
+          </a:p>
+          <a:p>
+            <a:pPr algn="ctr"/>
+            <a:r>
+              <a:rPr lang="en-US" b="1" dirty="0" smtClean="0">
+                <a:latin typeface="Helvetica Neue"/>
+                <a:cs typeface="Helvetica Neue"/>
+              </a:rPr>
+              <a:t>PLUGINS</a:t>
+            </a:r>
+            <a:endParaRPr lang="en-US" b="1" dirty="0">
+              <a:latin typeface="Helvetica Neue"/>
+              <a:cs typeface="Helvetica Neue"/>
+            </a:endParaRPr>
+          </a:p>
+        </p:txBody>
+      </p:sp>
+      <p:cxnSp>
+        <p:nvCxnSpPr>
+          <p:cNvPr id="52" name="Elbow Connector 51"/>
+          <p:cNvCxnSpPr>
+            <a:stCxn id="50" idx="2"/>
+          </p:cNvCxnSpPr>
+          <p:nvPr/>
+        </p:nvCxnSpPr>
+        <p:spPr>
+          <a:xfrm rot="10800000">
+            <a:off x="5117519" y="3618846"/>
+            <a:ext cx="2027207" cy="1438027"/>
+          </a:xfrm>
+          <a:prstGeom prst="bentConnector3">
+            <a:avLst>
+              <a:gd name="adj1" fmla="val 15013"/>
+            </a:avLst>
+          </a:prstGeom>
+          <a:ln w="50800" cap="flat" cmpd="sng" algn="ctr">
+            <a:solidFill>
+              <a:schemeClr val="accent5">
+                <a:lumMod val="40000"/>
+                <a:lumOff val="60000"/>
+              </a:schemeClr>
+            </a:solidFill>
+            <a:prstDash val="solid"/>
+            <a:round/>
+            <a:headEnd type="none" w="med" len="med"/>
+            <a:tailEnd type="triangle" w="lg" len="sm"/>
+          </a:ln>
+          <a:effectLst/>
+        </p:spPr>
+        <p:style>
+          <a:lnRef idx="2">
+            <a:schemeClr val="accent1"/>
+          </a:lnRef>
+          <a:fillRef idx="0">
+            <a:schemeClr val="accent1"/>
+          </a:fillRef>
+          <a:effectRef idx="1">
+            <a:schemeClr val="accent1"/>
+          </a:effectRef>
+          <a:fontRef idx="minor">
+            <a:schemeClr val="tx1"/>
+          </a:fontRef>
+        </p:style>
+      </p:cxnSp>
+      <p:sp>
+        <p:nvSpPr>
+          <p:cNvPr id="59" name="TextBox 58"/>
+          <p:cNvSpPr txBox="1"/>
+          <p:nvPr/>
+        </p:nvSpPr>
+        <p:spPr>
+          <a:xfrm>
+            <a:off x="5484339" y="3290748"/>
+            <a:ext cx="1326542" cy="369332"/>
+          </a:xfrm>
+          <a:prstGeom prst="rect">
+            <a:avLst/>
+          </a:prstGeom>
+          <a:noFill/>
+        </p:spPr>
+        <p:txBody>
+          <a:bodyPr wrap="none" rtlCol="0">
+            <a:spAutoFit/>
+          </a:bodyPr>
+          <a:lstStyle/>
+          <a:p>
+            <a:r>
+              <a:rPr lang="en-US" dirty="0" smtClean="0">
+                <a:solidFill>
+                  <a:srgbClr val="31859C"/>
+                </a:solidFill>
+                <a:latin typeface="Helvetica Neue"/>
+                <a:cs typeface="Helvetica Neue"/>
+              </a:rPr>
+              <a:t>access API</a:t>
+            </a:r>
+            <a:endParaRPr lang="en-US" dirty="0">
+              <a:solidFill>
+                <a:srgbClr val="31859C"/>
+              </a:solidFill>
               <a:latin typeface="Helvetica Neue"/>
               <a:cs typeface="Helvetica Neue"/>
             </a:endParaRPr>

</xml_diff>